<commit_message>
Try again to fix this backup mess
</commit_message>
<xml_diff>
--- a/CISC848/Implementation/Report/FigureEditor.pptx
+++ b/CISC848/Implementation/Report/FigureEditor.pptx
@@ -4,8 +4,12 @@
   <p:sldMasterIdLst>
     <p:sldMasterId id="2147483648" r:id="rId1"/>
   </p:sldMasterIdLst>
+  <p:notesMasterIdLst>
+    <p:notesMasterId r:id="rId4"/>
+  </p:notesMasterIdLst>
   <p:sldIdLst>
     <p:sldId id="256" r:id="rId2"/>
+    <p:sldId id="257" r:id="rId3"/>
   </p:sldIdLst>
   <p:sldSz cx="12192000" cy="6858000"/>
   <p:notesSz cx="6858000" cy="9144000"/>
@@ -104,7 +108,446 @@
       </a:defRPr>
     </a:lvl9pPr>
   </p:defaultTextStyle>
+  <p:extLst>
+    <p:ext uri="{EFAFB233-063F-42B5-8137-9DF3F51BA10A}">
+      <p15:sldGuideLst xmlns:p15="http://schemas.microsoft.com/office/powerpoint/2012/main"/>
+    </p:ext>
+  </p:extLst>
 </p:presentation>
+</file>
+
+<file path=ppt/notesMasters/notesMaster1.xml><?xml version="1.0" encoding="utf-8"?>
+<p:notesMaster xmlns:a="http://schemas.openxmlformats.org/drawingml/2006/main" xmlns:r="http://schemas.openxmlformats.org/officeDocument/2006/relationships" xmlns:p="http://schemas.openxmlformats.org/presentationml/2006/main">
+  <p:cSld>
+    <p:bg>
+      <p:bgRef idx="1001">
+        <a:schemeClr val="bg1"/>
+      </p:bgRef>
+    </p:bg>
+    <p:spTree>
+      <p:nvGrpSpPr>
+        <p:cNvPr id="1" name=""/>
+        <p:cNvGrpSpPr/>
+        <p:nvPr/>
+      </p:nvGrpSpPr>
+      <p:grpSpPr>
+        <a:xfrm>
+          <a:off x="0" y="0"/>
+          <a:ext cx="0" cy="0"/>
+          <a:chOff x="0" y="0"/>
+          <a:chExt cx="0" cy="0"/>
+        </a:xfrm>
+      </p:grpSpPr>
+      <p:sp>
+        <p:nvSpPr>
+          <p:cNvPr id="2" name="Header Placeholder 1"/>
+          <p:cNvSpPr>
+            <a:spLocks noGrp="1"/>
+          </p:cNvSpPr>
+          <p:nvPr>
+            <p:ph type="hdr" sz="quarter"/>
+          </p:nvPr>
+        </p:nvSpPr>
+        <p:spPr>
+          <a:xfrm>
+            <a:off x="0" y="0"/>
+            <a:ext cx="2971800" cy="458788"/>
+          </a:xfrm>
+          <a:prstGeom prst="rect">
+            <a:avLst/>
+          </a:prstGeom>
+        </p:spPr>
+        <p:txBody>
+          <a:bodyPr vert="horz" lIns="91440" tIns="45720" rIns="91440" bIns="45720" rtlCol="0"/>
+          <a:lstStyle>
+            <a:lvl1pPr algn="l">
+              <a:defRPr sz="1200"/>
+            </a:lvl1pPr>
+          </a:lstStyle>
+          <a:p>
+            <a:endParaRPr lang="en-CA"/>
+          </a:p>
+        </p:txBody>
+      </p:sp>
+      <p:sp>
+        <p:nvSpPr>
+          <p:cNvPr id="3" name="Date Placeholder 2"/>
+          <p:cNvSpPr>
+            <a:spLocks noGrp="1"/>
+          </p:cNvSpPr>
+          <p:nvPr>
+            <p:ph type="dt" idx="1"/>
+          </p:nvPr>
+        </p:nvSpPr>
+        <p:spPr>
+          <a:xfrm>
+            <a:off x="3884613" y="0"/>
+            <a:ext cx="2971800" cy="458788"/>
+          </a:xfrm>
+          <a:prstGeom prst="rect">
+            <a:avLst/>
+          </a:prstGeom>
+        </p:spPr>
+        <p:txBody>
+          <a:bodyPr vert="horz" lIns="91440" tIns="45720" rIns="91440" bIns="45720" rtlCol="0"/>
+          <a:lstStyle>
+            <a:lvl1pPr algn="r">
+              <a:defRPr sz="1200"/>
+            </a:lvl1pPr>
+          </a:lstStyle>
+          <a:p>
+            <a:fld id="{3B5B2694-9C63-4463-BFE9-B0BFE2993624}" type="datetimeFigureOut">
+              <a:rPr lang="en-CA" smtClean="0"/>
+              <a:t>2017-04-08</a:t>
+            </a:fld>
+            <a:endParaRPr lang="en-CA"/>
+          </a:p>
+        </p:txBody>
+      </p:sp>
+      <p:sp>
+        <p:nvSpPr>
+          <p:cNvPr id="4" name="Slide Image Placeholder 3"/>
+          <p:cNvSpPr>
+            <a:spLocks noGrp="1" noRot="1" noChangeAspect="1"/>
+          </p:cNvSpPr>
+          <p:nvPr>
+            <p:ph type="sldImg" idx="2"/>
+          </p:nvPr>
+        </p:nvSpPr>
+        <p:spPr>
+          <a:xfrm>
+            <a:off x="685800" y="1143000"/>
+            <a:ext cx="5486400" cy="3086100"/>
+          </a:xfrm>
+          <a:prstGeom prst="rect">
+            <a:avLst/>
+          </a:prstGeom>
+          <a:noFill/>
+          <a:ln w="12700">
+            <a:solidFill>
+              <a:prstClr val="black"/>
+            </a:solidFill>
+          </a:ln>
+        </p:spPr>
+        <p:txBody>
+          <a:bodyPr vert="horz" lIns="91440" tIns="45720" rIns="91440" bIns="45720" rtlCol="0" anchor="ctr"/>
+          <a:lstStyle/>
+          <a:p>
+            <a:endParaRPr lang="en-CA"/>
+          </a:p>
+        </p:txBody>
+      </p:sp>
+      <p:sp>
+        <p:nvSpPr>
+          <p:cNvPr id="5" name="Notes Placeholder 4"/>
+          <p:cNvSpPr>
+            <a:spLocks noGrp="1"/>
+          </p:cNvSpPr>
+          <p:nvPr>
+            <p:ph type="body" sz="quarter" idx="3"/>
+          </p:nvPr>
+        </p:nvSpPr>
+        <p:spPr>
+          <a:xfrm>
+            <a:off x="685800" y="4400550"/>
+            <a:ext cx="5486400" cy="3600450"/>
+          </a:xfrm>
+          <a:prstGeom prst="rect">
+            <a:avLst/>
+          </a:prstGeom>
+        </p:spPr>
+        <p:txBody>
+          <a:bodyPr vert="horz" lIns="91440" tIns="45720" rIns="91440" bIns="45720" rtlCol="0"/>
+          <a:lstStyle/>
+          <a:p>
+            <a:pPr lvl="0"/>
+            <a:r>
+              <a:rPr lang="en-US" smtClean="0"/>
+              <a:t>Click to edit Master text styles</a:t>
+            </a:r>
+          </a:p>
+          <a:p>
+            <a:pPr lvl="1"/>
+            <a:r>
+              <a:rPr lang="en-US" smtClean="0"/>
+              <a:t>Second level</a:t>
+            </a:r>
+          </a:p>
+          <a:p>
+            <a:pPr lvl="2"/>
+            <a:r>
+              <a:rPr lang="en-US" smtClean="0"/>
+              <a:t>Third level</a:t>
+            </a:r>
+          </a:p>
+          <a:p>
+            <a:pPr lvl="3"/>
+            <a:r>
+              <a:rPr lang="en-US" smtClean="0"/>
+              <a:t>Fourth level</a:t>
+            </a:r>
+          </a:p>
+          <a:p>
+            <a:pPr lvl="4"/>
+            <a:r>
+              <a:rPr lang="en-US" smtClean="0"/>
+              <a:t>Fifth level</a:t>
+            </a:r>
+            <a:endParaRPr lang="en-CA"/>
+          </a:p>
+        </p:txBody>
+      </p:sp>
+      <p:sp>
+        <p:nvSpPr>
+          <p:cNvPr id="6" name="Footer Placeholder 5"/>
+          <p:cNvSpPr>
+            <a:spLocks noGrp="1"/>
+          </p:cNvSpPr>
+          <p:nvPr>
+            <p:ph type="ftr" sz="quarter" idx="4"/>
+          </p:nvPr>
+        </p:nvSpPr>
+        <p:spPr>
+          <a:xfrm>
+            <a:off x="0" y="8685213"/>
+            <a:ext cx="2971800" cy="458787"/>
+          </a:xfrm>
+          <a:prstGeom prst="rect">
+            <a:avLst/>
+          </a:prstGeom>
+        </p:spPr>
+        <p:txBody>
+          <a:bodyPr vert="horz" lIns="91440" tIns="45720" rIns="91440" bIns="45720" rtlCol="0" anchor="b"/>
+          <a:lstStyle>
+            <a:lvl1pPr algn="l">
+              <a:defRPr sz="1200"/>
+            </a:lvl1pPr>
+          </a:lstStyle>
+          <a:p>
+            <a:endParaRPr lang="en-CA"/>
+          </a:p>
+        </p:txBody>
+      </p:sp>
+      <p:sp>
+        <p:nvSpPr>
+          <p:cNvPr id="7" name="Slide Number Placeholder 6"/>
+          <p:cNvSpPr>
+            <a:spLocks noGrp="1"/>
+          </p:cNvSpPr>
+          <p:nvPr>
+            <p:ph type="sldNum" sz="quarter" idx="5"/>
+          </p:nvPr>
+        </p:nvSpPr>
+        <p:spPr>
+          <a:xfrm>
+            <a:off x="3884613" y="8685213"/>
+            <a:ext cx="2971800" cy="458787"/>
+          </a:xfrm>
+          <a:prstGeom prst="rect">
+            <a:avLst/>
+          </a:prstGeom>
+        </p:spPr>
+        <p:txBody>
+          <a:bodyPr vert="horz" lIns="91440" tIns="45720" rIns="91440" bIns="45720" rtlCol="0" anchor="b"/>
+          <a:lstStyle>
+            <a:lvl1pPr algn="r">
+              <a:defRPr sz="1200"/>
+            </a:lvl1pPr>
+          </a:lstStyle>
+          <a:p>
+            <a:fld id="{C0E94181-4D29-450E-927E-59E1E9095A97}" type="slidenum">
+              <a:rPr lang="en-CA" smtClean="0"/>
+              <a:t>‹#›</a:t>
+            </a:fld>
+            <a:endParaRPr lang="en-CA"/>
+          </a:p>
+        </p:txBody>
+      </p:sp>
+    </p:spTree>
+    <p:extLst>
+      <p:ext uri="{BB962C8B-B14F-4D97-AF65-F5344CB8AC3E}">
+        <p14:creationId xmlns:p14="http://schemas.microsoft.com/office/powerpoint/2010/main" val="1282897089"/>
+      </p:ext>
+    </p:extLst>
+  </p:cSld>
+  <p:clrMap bg1="lt1" tx1="dk1" bg2="lt2" tx2="dk2" accent1="accent1" accent2="accent2" accent3="accent3" accent4="accent4" accent5="accent5" accent6="accent6" hlink="hlink" folHlink="folHlink"/>
+  <p:notesStyle>
+    <a:lvl1pPr marL="0" algn="l" defTabSz="914400" rtl="0" eaLnBrk="1" latinLnBrk="0" hangingPunct="1">
+      <a:defRPr sz="1200" kern="1200">
+        <a:solidFill>
+          <a:schemeClr val="tx1"/>
+        </a:solidFill>
+        <a:latin typeface="+mn-lt"/>
+        <a:ea typeface="+mn-ea"/>
+        <a:cs typeface="+mn-cs"/>
+      </a:defRPr>
+    </a:lvl1pPr>
+    <a:lvl2pPr marL="457200" algn="l" defTabSz="914400" rtl="0" eaLnBrk="1" latinLnBrk="0" hangingPunct="1">
+      <a:defRPr sz="1200" kern="1200">
+        <a:solidFill>
+          <a:schemeClr val="tx1"/>
+        </a:solidFill>
+        <a:latin typeface="+mn-lt"/>
+        <a:ea typeface="+mn-ea"/>
+        <a:cs typeface="+mn-cs"/>
+      </a:defRPr>
+    </a:lvl2pPr>
+    <a:lvl3pPr marL="914400" algn="l" defTabSz="914400" rtl="0" eaLnBrk="1" latinLnBrk="0" hangingPunct="1">
+      <a:defRPr sz="1200" kern="1200">
+        <a:solidFill>
+          <a:schemeClr val="tx1"/>
+        </a:solidFill>
+        <a:latin typeface="+mn-lt"/>
+        <a:ea typeface="+mn-ea"/>
+        <a:cs typeface="+mn-cs"/>
+      </a:defRPr>
+    </a:lvl3pPr>
+    <a:lvl4pPr marL="1371600" algn="l" defTabSz="914400" rtl="0" eaLnBrk="1" latinLnBrk="0" hangingPunct="1">
+      <a:defRPr sz="1200" kern="1200">
+        <a:solidFill>
+          <a:schemeClr val="tx1"/>
+        </a:solidFill>
+        <a:latin typeface="+mn-lt"/>
+        <a:ea typeface="+mn-ea"/>
+        <a:cs typeface="+mn-cs"/>
+      </a:defRPr>
+    </a:lvl4pPr>
+    <a:lvl5pPr marL="1828800" algn="l" defTabSz="914400" rtl="0" eaLnBrk="1" latinLnBrk="0" hangingPunct="1">
+      <a:defRPr sz="1200" kern="1200">
+        <a:solidFill>
+          <a:schemeClr val="tx1"/>
+        </a:solidFill>
+        <a:latin typeface="+mn-lt"/>
+        <a:ea typeface="+mn-ea"/>
+        <a:cs typeface="+mn-cs"/>
+      </a:defRPr>
+    </a:lvl5pPr>
+    <a:lvl6pPr marL="2286000" algn="l" defTabSz="914400" rtl="0" eaLnBrk="1" latinLnBrk="0" hangingPunct="1">
+      <a:defRPr sz="1200" kern="1200">
+        <a:solidFill>
+          <a:schemeClr val="tx1"/>
+        </a:solidFill>
+        <a:latin typeface="+mn-lt"/>
+        <a:ea typeface="+mn-ea"/>
+        <a:cs typeface="+mn-cs"/>
+      </a:defRPr>
+    </a:lvl6pPr>
+    <a:lvl7pPr marL="2743200" algn="l" defTabSz="914400" rtl="0" eaLnBrk="1" latinLnBrk="0" hangingPunct="1">
+      <a:defRPr sz="1200" kern="1200">
+        <a:solidFill>
+          <a:schemeClr val="tx1"/>
+        </a:solidFill>
+        <a:latin typeface="+mn-lt"/>
+        <a:ea typeface="+mn-ea"/>
+        <a:cs typeface="+mn-cs"/>
+      </a:defRPr>
+    </a:lvl7pPr>
+    <a:lvl8pPr marL="3200400" algn="l" defTabSz="914400" rtl="0" eaLnBrk="1" latinLnBrk="0" hangingPunct="1">
+      <a:defRPr sz="1200" kern="1200">
+        <a:solidFill>
+          <a:schemeClr val="tx1"/>
+        </a:solidFill>
+        <a:latin typeface="+mn-lt"/>
+        <a:ea typeface="+mn-ea"/>
+        <a:cs typeface="+mn-cs"/>
+      </a:defRPr>
+    </a:lvl8pPr>
+    <a:lvl9pPr marL="3657600" algn="l" defTabSz="914400" rtl="0" eaLnBrk="1" latinLnBrk="0" hangingPunct="1">
+      <a:defRPr sz="1200" kern="1200">
+        <a:solidFill>
+          <a:schemeClr val="tx1"/>
+        </a:solidFill>
+        <a:latin typeface="+mn-lt"/>
+        <a:ea typeface="+mn-ea"/>
+        <a:cs typeface="+mn-cs"/>
+      </a:defRPr>
+    </a:lvl9pPr>
+  </p:notesStyle>
+</p:notesMaster>
+</file>
+
+<file path=ppt/notesSlides/notesSlide1.xml><?xml version="1.0" encoding="utf-8"?>
+<p:notes xmlns:a="http://schemas.openxmlformats.org/drawingml/2006/main" xmlns:r="http://schemas.openxmlformats.org/officeDocument/2006/relationships" xmlns:p="http://schemas.openxmlformats.org/presentationml/2006/main">
+  <p:cSld>
+    <p:spTree>
+      <p:nvGrpSpPr>
+        <p:cNvPr id="1" name=""/>
+        <p:cNvGrpSpPr/>
+        <p:nvPr/>
+      </p:nvGrpSpPr>
+      <p:grpSpPr>
+        <a:xfrm>
+          <a:off x="0" y="0"/>
+          <a:ext cx="0" cy="0"/>
+          <a:chOff x="0" y="0"/>
+          <a:chExt cx="0" cy="0"/>
+        </a:xfrm>
+      </p:grpSpPr>
+      <p:sp>
+        <p:nvSpPr>
+          <p:cNvPr id="2" name="Slide Image Placeholder 1"/>
+          <p:cNvSpPr>
+            <a:spLocks noGrp="1" noRot="1" noChangeAspect="1"/>
+          </p:cNvSpPr>
+          <p:nvPr>
+            <p:ph type="sldImg"/>
+          </p:nvPr>
+        </p:nvSpPr>
+        <p:spPr/>
+      </p:sp>
+      <p:sp>
+        <p:nvSpPr>
+          <p:cNvPr id="3" name="Notes Placeholder 2"/>
+          <p:cNvSpPr>
+            <a:spLocks noGrp="1"/>
+          </p:cNvSpPr>
+          <p:nvPr>
+            <p:ph type="body" idx="1"/>
+          </p:nvPr>
+        </p:nvSpPr>
+        <p:spPr/>
+        <p:txBody>
+          <a:bodyPr/>
+          <a:lstStyle/>
+          <a:p>
+            <a:endParaRPr lang="en-CA" dirty="0"/>
+          </a:p>
+        </p:txBody>
+      </p:sp>
+      <p:sp>
+        <p:nvSpPr>
+          <p:cNvPr id="4" name="Slide Number Placeholder 3"/>
+          <p:cNvSpPr>
+            <a:spLocks noGrp="1"/>
+          </p:cNvSpPr>
+          <p:nvPr>
+            <p:ph type="sldNum" sz="quarter" idx="10"/>
+          </p:nvPr>
+        </p:nvSpPr>
+        <p:spPr/>
+        <p:txBody>
+          <a:bodyPr/>
+          <a:lstStyle/>
+          <a:p>
+            <a:fld id="{C0E94181-4D29-450E-927E-59E1E9095A97}" type="slidenum">
+              <a:rPr lang="en-CA" smtClean="0"/>
+              <a:t>2</a:t>
+            </a:fld>
+            <a:endParaRPr lang="en-CA"/>
+          </a:p>
+        </p:txBody>
+      </p:sp>
+    </p:spTree>
+    <p:extLst>
+      <p:ext uri="{BB962C8B-B14F-4D97-AF65-F5344CB8AC3E}">
+        <p14:creationId xmlns:p14="http://schemas.microsoft.com/office/powerpoint/2010/main" val="283620183"/>
+      </p:ext>
+    </p:extLst>
+  </p:cSld>
+  <p:clrMapOvr>
+    <a:masterClrMapping/>
+  </p:clrMapOvr>
+</p:notes>
 </file>
 
 <file path=ppt/slideLayouts/slideLayout1.xml><?xml version="1.0" encoding="utf-8"?>
@@ -238,7 +681,7 @@
           <a:p>
             <a:fld id="{A1D98AD6-9643-4E28-B50C-AF4D4CFB24A7}" type="datetimeFigureOut">
               <a:rPr lang="en-CA" smtClean="0"/>
-              <a:t>2017-03-28</a:t>
+              <a:t>2017-04-08</a:t>
             </a:fld>
             <a:endParaRPr lang="en-CA"/>
           </a:p>
@@ -408,7 +851,7 @@
           <a:p>
             <a:fld id="{A1D98AD6-9643-4E28-B50C-AF4D4CFB24A7}" type="datetimeFigureOut">
               <a:rPr lang="en-CA" smtClean="0"/>
-              <a:t>2017-03-28</a:t>
+              <a:t>2017-04-08</a:t>
             </a:fld>
             <a:endParaRPr lang="en-CA"/>
           </a:p>
@@ -588,7 +1031,7 @@
           <a:p>
             <a:fld id="{A1D98AD6-9643-4E28-B50C-AF4D4CFB24A7}" type="datetimeFigureOut">
               <a:rPr lang="en-CA" smtClean="0"/>
-              <a:t>2017-03-28</a:t>
+              <a:t>2017-04-08</a:t>
             </a:fld>
             <a:endParaRPr lang="en-CA"/>
           </a:p>
@@ -758,7 +1201,7 @@
           <a:p>
             <a:fld id="{A1D98AD6-9643-4E28-B50C-AF4D4CFB24A7}" type="datetimeFigureOut">
               <a:rPr lang="en-CA" smtClean="0"/>
-              <a:t>2017-03-28</a:t>
+              <a:t>2017-04-08</a:t>
             </a:fld>
             <a:endParaRPr lang="en-CA"/>
           </a:p>
@@ -1004,7 +1447,7 @@
           <a:p>
             <a:fld id="{A1D98AD6-9643-4E28-B50C-AF4D4CFB24A7}" type="datetimeFigureOut">
               <a:rPr lang="en-CA" smtClean="0"/>
-              <a:t>2017-03-28</a:t>
+              <a:t>2017-04-08</a:t>
             </a:fld>
             <a:endParaRPr lang="en-CA"/>
           </a:p>
@@ -1236,7 +1679,7 @@
           <a:p>
             <a:fld id="{A1D98AD6-9643-4E28-B50C-AF4D4CFB24A7}" type="datetimeFigureOut">
               <a:rPr lang="en-CA" smtClean="0"/>
-              <a:t>2017-03-28</a:t>
+              <a:t>2017-04-08</a:t>
             </a:fld>
             <a:endParaRPr lang="en-CA"/>
           </a:p>
@@ -1603,7 +2046,7 @@
           <a:p>
             <a:fld id="{A1D98AD6-9643-4E28-B50C-AF4D4CFB24A7}" type="datetimeFigureOut">
               <a:rPr lang="en-CA" smtClean="0"/>
-              <a:t>2017-03-28</a:t>
+              <a:t>2017-04-08</a:t>
             </a:fld>
             <a:endParaRPr lang="en-CA"/>
           </a:p>
@@ -1721,7 +2164,7 @@
           <a:p>
             <a:fld id="{A1D98AD6-9643-4E28-B50C-AF4D4CFB24A7}" type="datetimeFigureOut">
               <a:rPr lang="en-CA" smtClean="0"/>
-              <a:t>2017-03-28</a:t>
+              <a:t>2017-04-08</a:t>
             </a:fld>
             <a:endParaRPr lang="en-CA"/>
           </a:p>
@@ -1816,7 +2259,7 @@
           <a:p>
             <a:fld id="{A1D98AD6-9643-4E28-B50C-AF4D4CFB24A7}" type="datetimeFigureOut">
               <a:rPr lang="en-CA" smtClean="0"/>
-              <a:t>2017-03-28</a:t>
+              <a:t>2017-04-08</a:t>
             </a:fld>
             <a:endParaRPr lang="en-CA"/>
           </a:p>
@@ -2093,7 +2536,7 @@
           <a:p>
             <a:fld id="{A1D98AD6-9643-4E28-B50C-AF4D4CFB24A7}" type="datetimeFigureOut">
               <a:rPr lang="en-CA" smtClean="0"/>
-              <a:t>2017-03-28</a:t>
+              <a:t>2017-04-08</a:t>
             </a:fld>
             <a:endParaRPr lang="en-CA"/>
           </a:p>
@@ -2346,7 +2789,7 @@
           <a:p>
             <a:fld id="{A1D98AD6-9643-4E28-B50C-AF4D4CFB24A7}" type="datetimeFigureOut">
               <a:rPr lang="en-CA" smtClean="0"/>
-              <a:t>2017-03-28</a:t>
+              <a:t>2017-04-08</a:t>
             </a:fld>
             <a:endParaRPr lang="en-CA"/>
           </a:p>
@@ -2559,7 +3002,7 @@
           <a:p>
             <a:fld id="{A1D98AD6-9643-4E28-B50C-AF4D4CFB24A7}" type="datetimeFigureOut">
               <a:rPr lang="en-CA" smtClean="0"/>
-              <a:t>2017-03-28</a:t>
+              <a:t>2017-04-08</a:t>
             </a:fld>
             <a:endParaRPr lang="en-CA"/>
           </a:p>
@@ -3448,6 +3891,1539 @@
 </p:sld>
 </file>
 
+<file path=ppt/slides/slide2.xml><?xml version="1.0" encoding="utf-8"?>
+<p:sld xmlns:a="http://schemas.openxmlformats.org/drawingml/2006/main" xmlns:r="http://schemas.openxmlformats.org/officeDocument/2006/relationships" xmlns:p="http://schemas.openxmlformats.org/presentationml/2006/main">
+  <p:cSld>
+    <p:spTree>
+      <p:nvGrpSpPr>
+        <p:cNvPr id="1" name=""/>
+        <p:cNvGrpSpPr/>
+        <p:nvPr/>
+      </p:nvGrpSpPr>
+      <p:grpSpPr>
+        <a:xfrm>
+          <a:off x="0" y="0"/>
+          <a:ext cx="0" cy="0"/>
+          <a:chOff x="0" y="0"/>
+          <a:chExt cx="0" cy="0"/>
+        </a:xfrm>
+      </p:grpSpPr>
+      <p:grpSp>
+        <p:nvGrpSpPr>
+          <p:cNvPr id="12" name="Group 11"/>
+          <p:cNvGrpSpPr/>
+          <p:nvPr/>
+        </p:nvGrpSpPr>
+        <p:grpSpPr>
+          <a:xfrm>
+            <a:off x="2278680" y="309772"/>
+            <a:ext cx="9015411" cy="6669204"/>
+            <a:chOff x="2278680" y="309772"/>
+            <a:chExt cx="9015411" cy="6669204"/>
+          </a:xfrm>
+        </p:grpSpPr>
+        <p:grpSp>
+          <p:nvGrpSpPr>
+            <p:cNvPr id="2" name="Group 1"/>
+            <p:cNvGrpSpPr/>
+            <p:nvPr/>
+          </p:nvGrpSpPr>
+          <p:grpSpPr>
+            <a:xfrm>
+              <a:off x="5131324" y="309772"/>
+              <a:ext cx="1232263" cy="1161633"/>
+              <a:chOff x="2782389" y="1755583"/>
+              <a:chExt cx="1232263" cy="1161633"/>
+            </a:xfrm>
+          </p:grpSpPr>
+          <p:sp>
+            <p:nvSpPr>
+              <p:cNvPr id="3" name="Rounded Rectangle 4"/>
+              <p:cNvSpPr/>
+              <p:nvPr/>
+            </p:nvSpPr>
+            <p:spPr>
+              <a:xfrm>
+                <a:off x="2782389" y="1966123"/>
+                <a:ext cx="1232263" cy="740554"/>
+              </a:xfrm>
+              <a:prstGeom prst="flowChartMagneticDisk">
+                <a:avLst/>
+              </a:prstGeom>
+              <a:solidFill>
+                <a:srgbClr val="FF8F8F"/>
+              </a:solidFill>
+              <a:ln w="57150">
+                <a:solidFill>
+                  <a:schemeClr val="tx1"/>
+                </a:solidFill>
+              </a:ln>
+            </p:spPr>
+            <p:style>
+              <a:lnRef idx="2">
+                <a:schemeClr val="accent1">
+                  <a:shade val="50000"/>
+                </a:schemeClr>
+              </a:lnRef>
+              <a:fillRef idx="1">
+                <a:schemeClr val="accent1"/>
+              </a:fillRef>
+              <a:effectRef idx="0">
+                <a:schemeClr val="accent1"/>
+              </a:effectRef>
+              <a:fontRef idx="minor">
+                <a:schemeClr val="lt1"/>
+              </a:fontRef>
+            </p:style>
+            <p:txBody>
+              <a:bodyPr rtlCol="0" anchor="ctr"/>
+              <a:lstStyle/>
+              <a:p>
+                <a:pPr algn="ctr"/>
+                <a:endParaRPr lang="en-CA"/>
+              </a:p>
+            </p:txBody>
+          </p:sp>
+          <p:sp>
+            <p:nvSpPr>
+              <p:cNvPr id="4" name="TextBox 3"/>
+              <p:cNvSpPr txBox="1"/>
+              <p:nvPr/>
+            </p:nvSpPr>
+            <p:spPr>
+              <a:xfrm>
+                <a:off x="2889069" y="1755583"/>
+                <a:ext cx="1018902" cy="1161633"/>
+              </a:xfrm>
+              <a:prstGeom prst="flowChartMagneticDisk">
+                <a:avLst/>
+              </a:prstGeom>
+              <a:noFill/>
+            </p:spPr>
+            <p:txBody>
+              <a:bodyPr wrap="square" rtlCol="0" anchor="ctr">
+                <a:spAutoFit/>
+              </a:bodyPr>
+              <a:lstStyle/>
+              <a:p>
+                <a:pPr algn="ctr"/>
+                <a:r>
+                  <a:rPr lang="en-US" sz="3200" dirty="0" smtClean="0"/>
+                  <a:t>NVD</a:t>
+                </a:r>
+                <a:endParaRPr lang="en-CA" dirty="0"/>
+              </a:p>
+            </p:txBody>
+          </p:sp>
+        </p:grpSp>
+        <p:sp>
+          <p:nvSpPr>
+            <p:cNvPr id="9" name="Rounded Rectangle 8"/>
+            <p:cNvSpPr/>
+            <p:nvPr/>
+          </p:nvSpPr>
+          <p:spPr>
+            <a:xfrm>
+              <a:off x="6571593" y="1687323"/>
+              <a:ext cx="2019971" cy="740554"/>
+            </a:xfrm>
+            <a:prstGeom prst="roundRect">
+              <a:avLst/>
+            </a:prstGeom>
+            <a:solidFill>
+              <a:schemeClr val="bg1"/>
+            </a:solidFill>
+            <a:ln w="57150">
+              <a:solidFill>
+                <a:schemeClr val="tx1"/>
+              </a:solidFill>
+            </a:ln>
+          </p:spPr>
+          <p:style>
+            <a:lnRef idx="2">
+              <a:schemeClr val="accent1">
+                <a:shade val="50000"/>
+              </a:schemeClr>
+            </a:lnRef>
+            <a:fillRef idx="1">
+              <a:schemeClr val="accent1"/>
+            </a:fillRef>
+            <a:effectRef idx="0">
+              <a:schemeClr val="accent1"/>
+            </a:effectRef>
+            <a:fontRef idx="minor">
+              <a:schemeClr val="lt1"/>
+            </a:fontRef>
+          </p:style>
+          <p:txBody>
+            <a:bodyPr rtlCol="0" anchor="ctr"/>
+            <a:lstStyle/>
+            <a:p>
+              <a:pPr algn="ctr"/>
+              <a:endParaRPr lang="en-CA"/>
+            </a:p>
+          </p:txBody>
+        </p:sp>
+        <p:sp>
+          <p:nvSpPr>
+            <p:cNvPr id="11" name="TextBox 10"/>
+            <p:cNvSpPr txBox="1"/>
+            <p:nvPr/>
+          </p:nvSpPr>
+          <p:spPr>
+            <a:xfrm>
+              <a:off x="6604250" y="1717627"/>
+              <a:ext cx="1998201" cy="584775"/>
+            </a:xfrm>
+            <a:prstGeom prst="rect">
+              <a:avLst/>
+            </a:prstGeom>
+            <a:noFill/>
+          </p:spPr>
+          <p:txBody>
+            <a:bodyPr wrap="square" rtlCol="0" anchor="ctr">
+              <a:spAutoFit/>
+            </a:bodyPr>
+            <a:lstStyle/>
+            <a:p>
+              <a:pPr algn="ctr"/>
+              <a:r>
+                <a:rPr lang="en-US" sz="3200" dirty="0" smtClean="0"/>
+                <a:t>Exploited?</a:t>
+              </a:r>
+              <a:endParaRPr lang="en-CA" dirty="0"/>
+            </a:p>
+          </p:txBody>
+        </p:sp>
+        <p:grpSp>
+          <p:nvGrpSpPr>
+            <p:cNvPr id="16" name="Group 15"/>
+            <p:cNvGrpSpPr/>
+            <p:nvPr/>
+          </p:nvGrpSpPr>
+          <p:grpSpPr>
+            <a:xfrm>
+              <a:off x="2500503" y="1488511"/>
+              <a:ext cx="2434335" cy="1077218"/>
+              <a:chOff x="4065125" y="4065839"/>
+              <a:chExt cx="2434335" cy="1077218"/>
+            </a:xfrm>
+          </p:grpSpPr>
+          <p:sp>
+            <p:nvSpPr>
+              <p:cNvPr id="17" name="Rounded Rectangle 16"/>
+              <p:cNvSpPr/>
+              <p:nvPr/>
+            </p:nvSpPr>
+            <p:spPr>
+              <a:xfrm>
+                <a:off x="4151397" y="4263458"/>
+                <a:ext cx="2258810" cy="740554"/>
+              </a:xfrm>
+              <a:prstGeom prst="roundRect">
+                <a:avLst/>
+              </a:prstGeom>
+              <a:solidFill>
+                <a:schemeClr val="bg1"/>
+              </a:solidFill>
+              <a:ln w="57150">
+                <a:solidFill>
+                  <a:schemeClr val="tx1"/>
+                </a:solidFill>
+              </a:ln>
+            </p:spPr>
+            <p:style>
+              <a:lnRef idx="2">
+                <a:schemeClr val="accent1">
+                  <a:shade val="50000"/>
+                </a:schemeClr>
+              </a:lnRef>
+              <a:fillRef idx="1">
+                <a:schemeClr val="accent1"/>
+              </a:fillRef>
+              <a:effectRef idx="0">
+                <a:schemeClr val="accent1"/>
+              </a:effectRef>
+              <a:fontRef idx="minor">
+                <a:schemeClr val="lt1"/>
+              </a:fontRef>
+            </p:style>
+            <p:txBody>
+              <a:bodyPr rtlCol="0" anchor="ctr"/>
+              <a:lstStyle/>
+              <a:p>
+                <a:pPr algn="ctr"/>
+                <a:endParaRPr lang="en-CA"/>
+              </a:p>
+            </p:txBody>
+          </p:sp>
+          <p:sp>
+            <p:nvSpPr>
+              <p:cNvPr id="18" name="TextBox 17"/>
+              <p:cNvSpPr txBox="1"/>
+              <p:nvPr/>
+            </p:nvSpPr>
+            <p:spPr>
+              <a:xfrm>
+                <a:off x="4065125" y="4065839"/>
+                <a:ext cx="2434335" cy="1077218"/>
+              </a:xfrm>
+              <a:prstGeom prst="rect">
+                <a:avLst/>
+              </a:prstGeom>
+              <a:noFill/>
+            </p:spPr>
+            <p:txBody>
+              <a:bodyPr wrap="square" rtlCol="0" anchor="ctr">
+                <a:spAutoFit/>
+              </a:bodyPr>
+              <a:lstStyle/>
+              <a:p>
+                <a:pPr algn="ctr"/>
+                <a:r>
+                  <a:rPr lang="en-US" sz="3200" dirty="0" smtClean="0"/>
+                  <a:t>Score vector</a:t>
+                </a:r>
+                <a:endParaRPr lang="en-CA" dirty="0"/>
+              </a:p>
+            </p:txBody>
+          </p:sp>
+        </p:grpSp>
+        <p:grpSp>
+          <p:nvGrpSpPr>
+            <p:cNvPr id="20" name="Group 19"/>
+            <p:cNvGrpSpPr/>
+            <p:nvPr/>
+          </p:nvGrpSpPr>
+          <p:grpSpPr>
+            <a:xfrm>
+              <a:off x="2278680" y="6238422"/>
+              <a:ext cx="2856412" cy="740554"/>
+              <a:chOff x="4145279" y="5511662"/>
+              <a:chExt cx="2856412" cy="740554"/>
+            </a:xfrm>
+          </p:grpSpPr>
+          <p:sp>
+            <p:nvSpPr>
+              <p:cNvPr id="21" name="Rounded Rectangle 20"/>
+              <p:cNvSpPr/>
+              <p:nvPr/>
+            </p:nvSpPr>
+            <p:spPr>
+              <a:xfrm>
+                <a:off x="4284617" y="5511662"/>
+                <a:ext cx="2577737" cy="740554"/>
+              </a:xfrm>
+              <a:prstGeom prst="roundRect">
+                <a:avLst/>
+              </a:prstGeom>
+              <a:solidFill>
+                <a:srgbClr val="FF8F8F"/>
+              </a:solidFill>
+              <a:ln w="57150">
+                <a:solidFill>
+                  <a:schemeClr val="tx1"/>
+                </a:solidFill>
+              </a:ln>
+            </p:spPr>
+            <p:style>
+              <a:lnRef idx="2">
+                <a:schemeClr val="accent1">
+                  <a:shade val="50000"/>
+                </a:schemeClr>
+              </a:lnRef>
+              <a:fillRef idx="1">
+                <a:schemeClr val="accent1"/>
+              </a:fillRef>
+              <a:effectRef idx="0">
+                <a:schemeClr val="accent1"/>
+              </a:effectRef>
+              <a:fontRef idx="minor">
+                <a:schemeClr val="lt1"/>
+              </a:fontRef>
+            </p:style>
+            <p:txBody>
+              <a:bodyPr rtlCol="0" anchor="ctr"/>
+              <a:lstStyle/>
+              <a:p>
+                <a:pPr algn="ctr"/>
+                <a:endParaRPr lang="en-CA"/>
+              </a:p>
+            </p:txBody>
+          </p:sp>
+          <p:sp>
+            <p:nvSpPr>
+              <p:cNvPr id="22" name="TextBox 21"/>
+              <p:cNvSpPr txBox="1"/>
+              <p:nvPr/>
+            </p:nvSpPr>
+            <p:spPr>
+              <a:xfrm>
+                <a:off x="4145279" y="5571078"/>
+                <a:ext cx="2856412" cy="584775"/>
+              </a:xfrm>
+              <a:prstGeom prst="rect">
+                <a:avLst/>
+              </a:prstGeom>
+              <a:noFill/>
+            </p:spPr>
+            <p:txBody>
+              <a:bodyPr wrap="square" rtlCol="0" anchor="ctr">
+                <a:spAutoFit/>
+              </a:bodyPr>
+              <a:lstStyle/>
+              <a:p>
+                <a:pPr algn="ctr"/>
+                <a:r>
+                  <a:rPr lang="en-US" sz="3200" dirty="0" smtClean="0"/>
+                  <a:t>Base Equation</a:t>
+                </a:r>
+                <a:endParaRPr lang="en-CA" dirty="0"/>
+              </a:p>
+            </p:txBody>
+          </p:sp>
+        </p:grpSp>
+        <p:grpSp>
+          <p:nvGrpSpPr>
+            <p:cNvPr id="23" name="Group 22"/>
+            <p:cNvGrpSpPr/>
+            <p:nvPr/>
+          </p:nvGrpSpPr>
+          <p:grpSpPr>
+            <a:xfrm>
+              <a:off x="2754886" y="3072400"/>
+              <a:ext cx="1924596" cy="722812"/>
+              <a:chOff x="1741713" y="4162697"/>
+              <a:chExt cx="1924596" cy="722812"/>
+            </a:xfrm>
+          </p:grpSpPr>
+          <p:sp>
+            <p:nvSpPr>
+              <p:cNvPr id="24" name="Oval 23"/>
+              <p:cNvSpPr/>
+              <p:nvPr/>
+            </p:nvSpPr>
+            <p:spPr>
+              <a:xfrm>
+                <a:off x="1741713" y="4162697"/>
+                <a:ext cx="1924596" cy="722812"/>
+              </a:xfrm>
+              <a:prstGeom prst="ellipse">
+                <a:avLst/>
+              </a:prstGeom>
+              <a:solidFill>
+                <a:schemeClr val="bg1"/>
+              </a:solidFill>
+              <a:ln w="57150">
+                <a:solidFill>
+                  <a:schemeClr val="tx1"/>
+                </a:solidFill>
+              </a:ln>
+            </p:spPr>
+            <p:style>
+              <a:lnRef idx="2">
+                <a:schemeClr val="accent1">
+                  <a:shade val="50000"/>
+                </a:schemeClr>
+              </a:lnRef>
+              <a:fillRef idx="1">
+                <a:schemeClr val="accent1"/>
+              </a:fillRef>
+              <a:effectRef idx="0">
+                <a:schemeClr val="accent1"/>
+              </a:effectRef>
+              <a:fontRef idx="minor">
+                <a:schemeClr val="lt1"/>
+              </a:fontRef>
+            </p:style>
+            <p:txBody>
+              <a:bodyPr rtlCol="0" anchor="ctr"/>
+              <a:lstStyle/>
+              <a:p>
+                <a:pPr algn="ctr"/>
+                <a:endParaRPr lang="en-CA"/>
+              </a:p>
+            </p:txBody>
+          </p:sp>
+          <p:sp>
+            <p:nvSpPr>
+              <p:cNvPr id="25" name="TextBox 24"/>
+              <p:cNvSpPr txBox="1"/>
+              <p:nvPr/>
+            </p:nvSpPr>
+            <p:spPr>
+              <a:xfrm>
+                <a:off x="1741713" y="4231715"/>
+                <a:ext cx="1924596" cy="584775"/>
+              </a:xfrm>
+              <a:prstGeom prst="rect">
+                <a:avLst/>
+              </a:prstGeom>
+              <a:noFill/>
+            </p:spPr>
+            <p:txBody>
+              <a:bodyPr wrap="square" rtlCol="0" anchor="ctr">
+                <a:spAutoFit/>
+              </a:bodyPr>
+              <a:lstStyle/>
+              <a:p>
+                <a:pPr algn="ctr"/>
+                <a:r>
+                  <a:rPr lang="en-US" sz="3200" dirty="0" smtClean="0"/>
+                  <a:t>Compute</a:t>
+                </a:r>
+                <a:endParaRPr lang="en-CA" dirty="0"/>
+              </a:p>
+            </p:txBody>
+          </p:sp>
+        </p:grpSp>
+        <p:grpSp>
+          <p:nvGrpSpPr>
+            <p:cNvPr id="27" name="Group 26"/>
+            <p:cNvGrpSpPr/>
+            <p:nvPr/>
+          </p:nvGrpSpPr>
+          <p:grpSpPr>
+            <a:xfrm>
+              <a:off x="2284149" y="4760923"/>
+              <a:ext cx="2856412" cy="740554"/>
+              <a:chOff x="4145279" y="5511662"/>
+              <a:chExt cx="2856412" cy="740554"/>
+            </a:xfrm>
+          </p:grpSpPr>
+          <p:sp>
+            <p:nvSpPr>
+              <p:cNvPr id="28" name="Rounded Rectangle 27"/>
+              <p:cNvSpPr/>
+              <p:nvPr/>
+            </p:nvSpPr>
+            <p:spPr>
+              <a:xfrm>
+                <a:off x="4284617" y="5511662"/>
+                <a:ext cx="2577737" cy="740554"/>
+              </a:xfrm>
+              <a:prstGeom prst="roundRect">
+                <a:avLst/>
+              </a:prstGeom>
+              <a:solidFill>
+                <a:schemeClr val="bg1"/>
+              </a:solidFill>
+              <a:ln w="57150">
+                <a:solidFill>
+                  <a:schemeClr val="tx1"/>
+                </a:solidFill>
+              </a:ln>
+            </p:spPr>
+            <p:style>
+              <a:lnRef idx="2">
+                <a:schemeClr val="accent1">
+                  <a:shade val="50000"/>
+                </a:schemeClr>
+              </a:lnRef>
+              <a:fillRef idx="1">
+                <a:schemeClr val="accent1"/>
+              </a:fillRef>
+              <a:effectRef idx="0">
+                <a:schemeClr val="accent1"/>
+              </a:effectRef>
+              <a:fontRef idx="minor">
+                <a:schemeClr val="lt1"/>
+              </a:fontRef>
+            </p:style>
+            <p:txBody>
+              <a:bodyPr rtlCol="0" anchor="ctr"/>
+              <a:lstStyle/>
+              <a:p>
+                <a:pPr algn="ctr"/>
+                <a:endParaRPr lang="en-CA"/>
+              </a:p>
+            </p:txBody>
+          </p:sp>
+          <p:sp>
+            <p:nvSpPr>
+              <p:cNvPr id="29" name="TextBox 28"/>
+              <p:cNvSpPr txBox="1"/>
+              <p:nvPr/>
+            </p:nvSpPr>
+            <p:spPr>
+              <a:xfrm>
+                <a:off x="4145279" y="5589550"/>
+                <a:ext cx="2856412" cy="584775"/>
+              </a:xfrm>
+              <a:prstGeom prst="rect">
+                <a:avLst/>
+              </a:prstGeom>
+              <a:noFill/>
+            </p:spPr>
+            <p:txBody>
+              <a:bodyPr wrap="square" rtlCol="0" anchor="ctr">
+                <a:spAutoFit/>
+              </a:bodyPr>
+              <a:lstStyle/>
+              <a:p>
+                <a:pPr algn="ctr"/>
+                <a:r>
+                  <a:rPr lang="en-US" sz="3200" dirty="0" smtClean="0"/>
+                  <a:t>Scores</a:t>
+                </a:r>
+                <a:endParaRPr lang="en-CA" dirty="0"/>
+              </a:p>
+            </p:txBody>
+          </p:sp>
+        </p:grpSp>
+        <p:grpSp>
+          <p:nvGrpSpPr>
+            <p:cNvPr id="31" name="Group 30"/>
+            <p:cNvGrpSpPr/>
+            <p:nvPr/>
+          </p:nvGrpSpPr>
+          <p:grpSpPr>
+            <a:xfrm>
+              <a:off x="9114738" y="3150263"/>
+              <a:ext cx="1924596" cy="722812"/>
+              <a:chOff x="1741713" y="4162697"/>
+              <a:chExt cx="1924596" cy="722812"/>
+            </a:xfrm>
+          </p:grpSpPr>
+          <p:sp>
+            <p:nvSpPr>
+              <p:cNvPr id="32" name="Oval 31"/>
+              <p:cNvSpPr/>
+              <p:nvPr/>
+            </p:nvSpPr>
+            <p:spPr>
+              <a:xfrm>
+                <a:off x="1741713" y="4162697"/>
+                <a:ext cx="1924596" cy="722812"/>
+              </a:xfrm>
+              <a:prstGeom prst="ellipse">
+                <a:avLst/>
+              </a:prstGeom>
+              <a:solidFill>
+                <a:schemeClr val="bg1"/>
+              </a:solidFill>
+              <a:ln w="57150">
+                <a:solidFill>
+                  <a:schemeClr val="tx1"/>
+                </a:solidFill>
+              </a:ln>
+            </p:spPr>
+            <p:style>
+              <a:lnRef idx="2">
+                <a:schemeClr val="accent1">
+                  <a:shade val="50000"/>
+                </a:schemeClr>
+              </a:lnRef>
+              <a:fillRef idx="1">
+                <a:schemeClr val="accent1"/>
+              </a:fillRef>
+              <a:effectRef idx="0">
+                <a:schemeClr val="accent1"/>
+              </a:effectRef>
+              <a:fontRef idx="minor">
+                <a:schemeClr val="lt1"/>
+              </a:fontRef>
+            </p:style>
+            <p:txBody>
+              <a:bodyPr rtlCol="0" anchor="ctr"/>
+              <a:lstStyle/>
+              <a:p>
+                <a:pPr algn="ctr"/>
+                <a:endParaRPr lang="en-CA"/>
+              </a:p>
+            </p:txBody>
+          </p:sp>
+          <p:sp>
+            <p:nvSpPr>
+              <p:cNvPr id="33" name="TextBox 32"/>
+              <p:cNvSpPr txBox="1"/>
+              <p:nvPr/>
+            </p:nvSpPr>
+            <p:spPr>
+              <a:xfrm>
+                <a:off x="1741713" y="4231715"/>
+                <a:ext cx="1924596" cy="584775"/>
+              </a:xfrm>
+              <a:prstGeom prst="rect">
+                <a:avLst/>
+              </a:prstGeom>
+              <a:noFill/>
+            </p:spPr>
+            <p:txBody>
+              <a:bodyPr wrap="square" rtlCol="0" anchor="ctr">
+                <a:spAutoFit/>
+              </a:bodyPr>
+              <a:lstStyle/>
+              <a:p>
+                <a:pPr algn="ctr"/>
+                <a:r>
+                  <a:rPr lang="en-US" sz="3200" dirty="0" smtClean="0"/>
+                  <a:t>Compare</a:t>
+                </a:r>
+                <a:endParaRPr lang="en-CA" dirty="0"/>
+              </a:p>
+            </p:txBody>
+          </p:sp>
+        </p:grpSp>
+        <p:grpSp>
+          <p:nvGrpSpPr>
+            <p:cNvPr id="38" name="Group 37"/>
+            <p:cNvGrpSpPr/>
+            <p:nvPr/>
+          </p:nvGrpSpPr>
+          <p:grpSpPr>
+            <a:xfrm>
+              <a:off x="8859756" y="4760923"/>
+              <a:ext cx="2434335" cy="740554"/>
+              <a:chOff x="4065125" y="4263458"/>
+              <a:chExt cx="2434335" cy="740554"/>
+            </a:xfrm>
+            <a:solidFill>
+              <a:srgbClr val="7283FE"/>
+            </a:solidFill>
+          </p:grpSpPr>
+          <p:sp>
+            <p:nvSpPr>
+              <p:cNvPr id="39" name="Rounded Rectangle 38"/>
+              <p:cNvSpPr/>
+              <p:nvPr/>
+            </p:nvSpPr>
+            <p:spPr>
+              <a:xfrm>
+                <a:off x="4151397" y="4263458"/>
+                <a:ext cx="2258810" cy="740554"/>
+              </a:xfrm>
+              <a:prstGeom prst="roundRect">
+                <a:avLst/>
+              </a:prstGeom>
+              <a:grpFill/>
+              <a:ln w="57150">
+                <a:solidFill>
+                  <a:schemeClr val="tx1"/>
+                </a:solidFill>
+              </a:ln>
+            </p:spPr>
+            <p:style>
+              <a:lnRef idx="2">
+                <a:schemeClr val="accent1">
+                  <a:shade val="50000"/>
+                </a:schemeClr>
+              </a:lnRef>
+              <a:fillRef idx="1">
+                <a:schemeClr val="accent1"/>
+              </a:fillRef>
+              <a:effectRef idx="0">
+                <a:schemeClr val="accent1"/>
+              </a:effectRef>
+              <a:fontRef idx="minor">
+                <a:schemeClr val="lt1"/>
+              </a:fontRef>
+            </p:style>
+            <p:txBody>
+              <a:bodyPr rtlCol="0" anchor="ctr"/>
+              <a:lstStyle/>
+              <a:p>
+                <a:pPr algn="ctr"/>
+                <a:endParaRPr lang="en-CA"/>
+              </a:p>
+            </p:txBody>
+          </p:sp>
+          <p:sp>
+            <p:nvSpPr>
+              <p:cNvPr id="40" name="TextBox 39"/>
+              <p:cNvSpPr txBox="1"/>
+              <p:nvPr/>
+            </p:nvSpPr>
+            <p:spPr>
+              <a:xfrm>
+                <a:off x="4065125" y="4312060"/>
+                <a:ext cx="2434335" cy="584775"/>
+              </a:xfrm>
+              <a:prstGeom prst="rect">
+                <a:avLst/>
+              </a:prstGeom>
+              <a:noFill/>
+            </p:spPr>
+            <p:txBody>
+              <a:bodyPr wrap="square" rtlCol="0" anchor="ctr">
+                <a:spAutoFit/>
+              </a:bodyPr>
+              <a:lstStyle/>
+              <a:p>
+                <a:pPr algn="ctr"/>
+                <a:r>
+                  <a:rPr lang="en-US" sz="3200" dirty="0" smtClean="0"/>
+                  <a:t>Metrics</a:t>
+                </a:r>
+                <a:endParaRPr lang="en-CA" dirty="0"/>
+              </a:p>
+            </p:txBody>
+          </p:sp>
+        </p:grpSp>
+        <p:grpSp>
+          <p:nvGrpSpPr>
+            <p:cNvPr id="41" name="Group 40"/>
+            <p:cNvGrpSpPr/>
+            <p:nvPr/>
+          </p:nvGrpSpPr>
+          <p:grpSpPr>
+            <a:xfrm>
+              <a:off x="5807419" y="6245526"/>
+              <a:ext cx="1924596" cy="722812"/>
+              <a:chOff x="1741713" y="4162697"/>
+              <a:chExt cx="1924596" cy="722812"/>
+            </a:xfrm>
+          </p:grpSpPr>
+          <p:sp>
+            <p:nvSpPr>
+              <p:cNvPr id="42" name="Oval 41"/>
+              <p:cNvSpPr/>
+              <p:nvPr/>
+            </p:nvSpPr>
+            <p:spPr>
+              <a:xfrm>
+                <a:off x="1741713" y="4162697"/>
+                <a:ext cx="1924596" cy="722812"/>
+              </a:xfrm>
+              <a:prstGeom prst="ellipse">
+                <a:avLst/>
+              </a:prstGeom>
+              <a:solidFill>
+                <a:schemeClr val="bg1"/>
+              </a:solidFill>
+              <a:ln w="57150">
+                <a:solidFill>
+                  <a:schemeClr val="tx1"/>
+                </a:solidFill>
+              </a:ln>
+            </p:spPr>
+            <p:style>
+              <a:lnRef idx="2">
+                <a:schemeClr val="accent1">
+                  <a:shade val="50000"/>
+                </a:schemeClr>
+              </a:lnRef>
+              <a:fillRef idx="1">
+                <a:schemeClr val="accent1"/>
+              </a:fillRef>
+              <a:effectRef idx="0">
+                <a:schemeClr val="accent1"/>
+              </a:effectRef>
+              <a:fontRef idx="minor">
+                <a:schemeClr val="lt1"/>
+              </a:fontRef>
+            </p:style>
+            <p:txBody>
+              <a:bodyPr rtlCol="0" anchor="ctr"/>
+              <a:lstStyle/>
+              <a:p>
+                <a:pPr algn="ctr"/>
+                <a:endParaRPr lang="en-CA"/>
+              </a:p>
+            </p:txBody>
+          </p:sp>
+          <p:sp>
+            <p:nvSpPr>
+              <p:cNvPr id="43" name="TextBox 42"/>
+              <p:cNvSpPr txBox="1"/>
+              <p:nvPr/>
+            </p:nvSpPr>
+            <p:spPr>
+              <a:xfrm>
+                <a:off x="1741713" y="4231715"/>
+                <a:ext cx="1924596" cy="584775"/>
+              </a:xfrm>
+              <a:prstGeom prst="rect">
+                <a:avLst/>
+              </a:prstGeom>
+              <a:noFill/>
+            </p:spPr>
+            <p:txBody>
+              <a:bodyPr wrap="square" rtlCol="0" anchor="ctr">
+                <a:spAutoFit/>
+              </a:bodyPr>
+              <a:lstStyle/>
+              <a:p>
+                <a:pPr algn="ctr"/>
+                <a:r>
+                  <a:rPr lang="en-US" sz="3200" dirty="0" smtClean="0"/>
+                  <a:t>Optimize</a:t>
+                </a:r>
+                <a:endParaRPr lang="en-CA" dirty="0"/>
+              </a:p>
+            </p:txBody>
+          </p:sp>
+        </p:grpSp>
+        <p:cxnSp>
+          <p:nvCxnSpPr>
+            <p:cNvPr id="48" name="Elbow Connector 47"/>
+            <p:cNvCxnSpPr>
+              <a:stCxn id="9" idx="3"/>
+              <a:endCxn id="32" idx="0"/>
+            </p:cNvCxnSpPr>
+            <p:nvPr/>
+          </p:nvCxnSpPr>
+          <p:spPr>
+            <a:xfrm>
+              <a:off x="8591564" y="2057600"/>
+              <a:ext cx="1485472" cy="1092663"/>
+            </a:xfrm>
+            <a:prstGeom prst="bentConnector2">
+              <a:avLst/>
+            </a:prstGeom>
+            <a:ln w="76200">
+              <a:solidFill>
+                <a:schemeClr val="tx1"/>
+              </a:solidFill>
+              <a:tailEnd type="triangle"/>
+            </a:ln>
+          </p:spPr>
+          <p:style>
+            <a:lnRef idx="1">
+              <a:schemeClr val="accent1"/>
+            </a:lnRef>
+            <a:fillRef idx="0">
+              <a:schemeClr val="accent1"/>
+            </a:fillRef>
+            <a:effectRef idx="0">
+              <a:schemeClr val="accent1"/>
+            </a:effectRef>
+            <a:fontRef idx="minor">
+              <a:schemeClr val="tx1"/>
+            </a:fontRef>
+          </p:style>
+        </p:cxnSp>
+        <p:cxnSp>
+          <p:nvCxnSpPr>
+            <p:cNvPr id="55" name="Elbow Connector 54"/>
+            <p:cNvCxnSpPr>
+              <a:stCxn id="3" idx="3"/>
+              <a:endCxn id="9" idx="1"/>
+            </p:cNvCxnSpPr>
+            <p:nvPr/>
+          </p:nvCxnSpPr>
+          <p:spPr>
+            <a:xfrm rot="16200000" flipH="1">
+              <a:off x="5761157" y="1247164"/>
+              <a:ext cx="796734" cy="824137"/>
+            </a:xfrm>
+            <a:prstGeom prst="bentConnector2">
+              <a:avLst/>
+            </a:prstGeom>
+            <a:ln w="76200">
+              <a:solidFill>
+                <a:schemeClr val="tx1"/>
+              </a:solidFill>
+              <a:tailEnd type="triangle"/>
+            </a:ln>
+          </p:spPr>
+          <p:style>
+            <a:lnRef idx="1">
+              <a:schemeClr val="accent1"/>
+            </a:lnRef>
+            <a:fillRef idx="0">
+              <a:schemeClr val="accent1"/>
+            </a:fillRef>
+            <a:effectRef idx="0">
+              <a:schemeClr val="accent1"/>
+            </a:effectRef>
+            <a:fontRef idx="minor">
+              <a:schemeClr val="tx1"/>
+            </a:fontRef>
+          </p:style>
+        </p:cxnSp>
+        <p:cxnSp>
+          <p:nvCxnSpPr>
+            <p:cNvPr id="57" name="Elbow Connector 56"/>
+            <p:cNvCxnSpPr>
+              <a:stCxn id="3" idx="3"/>
+              <a:endCxn id="17" idx="3"/>
+            </p:cNvCxnSpPr>
+            <p:nvPr/>
+          </p:nvCxnSpPr>
+          <p:spPr>
+            <a:xfrm rot="5400000">
+              <a:off x="4898751" y="1207701"/>
+              <a:ext cx="795541" cy="901871"/>
+            </a:xfrm>
+            <a:prstGeom prst="bentConnector2">
+              <a:avLst/>
+            </a:prstGeom>
+            <a:ln w="76200">
+              <a:solidFill>
+                <a:schemeClr val="tx1"/>
+              </a:solidFill>
+              <a:tailEnd type="triangle"/>
+            </a:ln>
+          </p:spPr>
+          <p:style>
+            <a:lnRef idx="1">
+              <a:schemeClr val="accent1"/>
+            </a:lnRef>
+            <a:fillRef idx="0">
+              <a:schemeClr val="accent1"/>
+            </a:fillRef>
+            <a:effectRef idx="0">
+              <a:schemeClr val="accent1"/>
+            </a:effectRef>
+            <a:fontRef idx="minor">
+              <a:schemeClr val="tx1"/>
+            </a:fontRef>
+          </p:style>
+        </p:cxnSp>
+        <p:cxnSp>
+          <p:nvCxnSpPr>
+            <p:cNvPr id="67" name="Straight Arrow Connector 66"/>
+            <p:cNvCxnSpPr>
+              <a:stCxn id="32" idx="4"/>
+              <a:endCxn id="39" idx="0"/>
+            </p:cNvCxnSpPr>
+            <p:nvPr/>
+          </p:nvCxnSpPr>
+          <p:spPr>
+            <a:xfrm flipH="1">
+              <a:off x="10075433" y="3873075"/>
+              <a:ext cx="1603" cy="887848"/>
+            </a:xfrm>
+            <a:prstGeom prst="straightConnector1">
+              <a:avLst/>
+            </a:prstGeom>
+            <a:ln w="76200">
+              <a:solidFill>
+                <a:schemeClr val="tx1"/>
+              </a:solidFill>
+              <a:tailEnd type="triangle"/>
+            </a:ln>
+          </p:spPr>
+          <p:style>
+            <a:lnRef idx="1">
+              <a:schemeClr val="accent1"/>
+            </a:lnRef>
+            <a:fillRef idx="0">
+              <a:schemeClr val="accent1"/>
+            </a:fillRef>
+            <a:effectRef idx="0">
+              <a:schemeClr val="accent1"/>
+            </a:effectRef>
+            <a:fontRef idx="minor">
+              <a:schemeClr val="tx1"/>
+            </a:fontRef>
+          </p:style>
+        </p:cxnSp>
+        <p:grpSp>
+          <p:nvGrpSpPr>
+            <p:cNvPr id="68" name="Group 67"/>
+            <p:cNvGrpSpPr/>
+            <p:nvPr/>
+          </p:nvGrpSpPr>
+          <p:grpSpPr>
+            <a:xfrm>
+              <a:off x="5821175" y="4764438"/>
+              <a:ext cx="1924596" cy="722812"/>
+              <a:chOff x="1741713" y="4162697"/>
+              <a:chExt cx="1924596" cy="722812"/>
+            </a:xfrm>
+          </p:grpSpPr>
+          <p:sp>
+            <p:nvSpPr>
+              <p:cNvPr id="69" name="Oval 68"/>
+              <p:cNvSpPr/>
+              <p:nvPr/>
+            </p:nvSpPr>
+            <p:spPr>
+              <a:xfrm>
+                <a:off x="1741713" y="4162697"/>
+                <a:ext cx="1924596" cy="722812"/>
+              </a:xfrm>
+              <a:prstGeom prst="ellipse">
+                <a:avLst/>
+              </a:prstGeom>
+              <a:solidFill>
+                <a:schemeClr val="bg1"/>
+              </a:solidFill>
+              <a:ln w="57150">
+                <a:solidFill>
+                  <a:schemeClr val="tx1"/>
+                </a:solidFill>
+              </a:ln>
+            </p:spPr>
+            <p:style>
+              <a:lnRef idx="2">
+                <a:schemeClr val="accent1">
+                  <a:shade val="50000"/>
+                </a:schemeClr>
+              </a:lnRef>
+              <a:fillRef idx="1">
+                <a:schemeClr val="accent1"/>
+              </a:fillRef>
+              <a:effectRef idx="0">
+                <a:schemeClr val="accent1"/>
+              </a:effectRef>
+              <a:fontRef idx="minor">
+                <a:schemeClr val="lt1"/>
+              </a:fontRef>
+            </p:style>
+            <p:txBody>
+              <a:bodyPr rtlCol="0" anchor="ctr"/>
+              <a:lstStyle/>
+              <a:p>
+                <a:pPr algn="ctr"/>
+                <a:endParaRPr lang="en-CA"/>
+              </a:p>
+            </p:txBody>
+          </p:sp>
+          <p:sp>
+            <p:nvSpPr>
+              <p:cNvPr id="70" name="TextBox 69"/>
+              <p:cNvSpPr txBox="1"/>
+              <p:nvPr/>
+            </p:nvSpPr>
+            <p:spPr>
+              <a:xfrm>
+                <a:off x="1741713" y="4231715"/>
+                <a:ext cx="1924596" cy="584775"/>
+              </a:xfrm>
+              <a:prstGeom prst="rect">
+                <a:avLst/>
+              </a:prstGeom>
+              <a:noFill/>
+            </p:spPr>
+            <p:txBody>
+              <a:bodyPr wrap="square" rtlCol="0" anchor="ctr">
+                <a:spAutoFit/>
+              </a:bodyPr>
+              <a:lstStyle/>
+              <a:p>
+                <a:pPr algn="ctr"/>
+                <a:r>
+                  <a:rPr lang="en-US" sz="3200" dirty="0" smtClean="0"/>
+                  <a:t>Predict</a:t>
+                </a:r>
+                <a:endParaRPr lang="en-CA" dirty="0"/>
+              </a:p>
+            </p:txBody>
+          </p:sp>
+        </p:grpSp>
+        <p:grpSp>
+          <p:nvGrpSpPr>
+            <p:cNvPr id="73" name="Group 72"/>
+            <p:cNvGrpSpPr/>
+            <p:nvPr/>
+          </p:nvGrpSpPr>
+          <p:grpSpPr>
+            <a:xfrm>
+              <a:off x="5727093" y="3128566"/>
+              <a:ext cx="2114389" cy="740554"/>
+              <a:chOff x="5652558" y="3146072"/>
+              <a:chExt cx="2114389" cy="740554"/>
+            </a:xfrm>
+          </p:grpSpPr>
+          <p:sp>
+            <p:nvSpPr>
+              <p:cNvPr id="71" name="Rounded Rectangle 70"/>
+              <p:cNvSpPr/>
+              <p:nvPr/>
+            </p:nvSpPr>
+            <p:spPr>
+              <a:xfrm>
+                <a:off x="5652558" y="3146072"/>
+                <a:ext cx="2114389" cy="740554"/>
+              </a:xfrm>
+              <a:prstGeom prst="roundRect">
+                <a:avLst/>
+              </a:prstGeom>
+              <a:solidFill>
+                <a:schemeClr val="bg1"/>
+              </a:solidFill>
+              <a:ln w="57150">
+                <a:solidFill>
+                  <a:schemeClr val="tx1"/>
+                </a:solidFill>
+              </a:ln>
+            </p:spPr>
+            <p:style>
+              <a:lnRef idx="2">
+                <a:schemeClr val="accent1">
+                  <a:shade val="50000"/>
+                </a:schemeClr>
+              </a:lnRef>
+              <a:fillRef idx="1">
+                <a:schemeClr val="accent1"/>
+              </a:fillRef>
+              <a:effectRef idx="0">
+                <a:schemeClr val="accent1"/>
+              </a:effectRef>
+              <a:fontRef idx="minor">
+                <a:schemeClr val="lt1"/>
+              </a:fontRef>
+            </p:style>
+            <p:txBody>
+              <a:bodyPr rtlCol="0" anchor="ctr"/>
+              <a:lstStyle/>
+              <a:p>
+                <a:pPr algn="ctr"/>
+                <a:endParaRPr lang="en-CA"/>
+              </a:p>
+            </p:txBody>
+          </p:sp>
+          <p:sp>
+            <p:nvSpPr>
+              <p:cNvPr id="72" name="TextBox 71"/>
+              <p:cNvSpPr txBox="1"/>
+              <p:nvPr/>
+            </p:nvSpPr>
+            <p:spPr>
+              <a:xfrm>
+                <a:off x="5652558" y="3211573"/>
+                <a:ext cx="2103720" cy="584775"/>
+              </a:xfrm>
+              <a:prstGeom prst="rect">
+                <a:avLst/>
+              </a:prstGeom>
+              <a:noFill/>
+            </p:spPr>
+            <p:txBody>
+              <a:bodyPr wrap="square" rtlCol="0" anchor="ctr">
+                <a:spAutoFit/>
+              </a:bodyPr>
+              <a:lstStyle/>
+              <a:p>
+                <a:pPr algn="ctr"/>
+                <a:r>
+                  <a:rPr lang="en-US" sz="3200" dirty="0" smtClean="0"/>
+                  <a:t>Predictions</a:t>
+                </a:r>
+                <a:endParaRPr lang="en-CA" dirty="0"/>
+              </a:p>
+            </p:txBody>
+          </p:sp>
+        </p:grpSp>
+        <p:cxnSp>
+          <p:nvCxnSpPr>
+            <p:cNvPr id="76" name="Straight Arrow Connector 75"/>
+            <p:cNvCxnSpPr>
+              <a:stCxn id="17" idx="2"/>
+              <a:endCxn id="24" idx="0"/>
+            </p:cNvCxnSpPr>
+            <p:nvPr/>
+          </p:nvCxnSpPr>
+          <p:spPr>
+            <a:xfrm>
+              <a:off x="3716180" y="2426684"/>
+              <a:ext cx="1004" cy="645716"/>
+            </a:xfrm>
+            <a:prstGeom prst="straightConnector1">
+              <a:avLst/>
+            </a:prstGeom>
+            <a:ln w="76200">
+              <a:solidFill>
+                <a:schemeClr val="tx1"/>
+              </a:solidFill>
+              <a:tailEnd type="triangle"/>
+            </a:ln>
+          </p:spPr>
+          <p:style>
+            <a:lnRef idx="1">
+              <a:schemeClr val="accent1"/>
+            </a:lnRef>
+            <a:fillRef idx="0">
+              <a:schemeClr val="accent1"/>
+            </a:fillRef>
+            <a:effectRef idx="0">
+              <a:schemeClr val="accent1"/>
+            </a:effectRef>
+            <a:fontRef idx="minor">
+              <a:schemeClr val="tx1"/>
+            </a:fontRef>
+          </p:style>
+        </p:cxnSp>
+        <p:cxnSp>
+          <p:nvCxnSpPr>
+            <p:cNvPr id="78" name="Straight Arrow Connector 77"/>
+            <p:cNvCxnSpPr>
+              <a:stCxn id="24" idx="4"/>
+              <a:endCxn id="28" idx="0"/>
+            </p:cNvCxnSpPr>
+            <p:nvPr/>
+          </p:nvCxnSpPr>
+          <p:spPr>
+            <a:xfrm flipH="1">
+              <a:off x="3712356" y="3795212"/>
+              <a:ext cx="4828" cy="965711"/>
+            </a:xfrm>
+            <a:prstGeom prst="straightConnector1">
+              <a:avLst/>
+            </a:prstGeom>
+            <a:ln w="76200">
+              <a:solidFill>
+                <a:schemeClr val="tx1"/>
+              </a:solidFill>
+              <a:tailEnd type="triangle"/>
+            </a:ln>
+          </p:spPr>
+          <p:style>
+            <a:lnRef idx="1">
+              <a:schemeClr val="accent1"/>
+            </a:lnRef>
+            <a:fillRef idx="0">
+              <a:schemeClr val="accent1"/>
+            </a:fillRef>
+            <a:effectRef idx="0">
+              <a:schemeClr val="accent1"/>
+            </a:effectRef>
+            <a:fontRef idx="minor">
+              <a:schemeClr val="tx1"/>
+            </a:fontRef>
+          </p:style>
+        </p:cxnSp>
+        <p:cxnSp>
+          <p:nvCxnSpPr>
+            <p:cNvPr id="81" name="Straight Arrow Connector 80"/>
+            <p:cNvCxnSpPr>
+              <a:stCxn id="28" idx="3"/>
+              <a:endCxn id="69" idx="2"/>
+            </p:cNvCxnSpPr>
+            <p:nvPr/>
+          </p:nvCxnSpPr>
+          <p:spPr>
+            <a:xfrm flipV="1">
+              <a:off x="5001224" y="5125844"/>
+              <a:ext cx="819951" cy="5356"/>
+            </a:xfrm>
+            <a:prstGeom prst="straightConnector1">
+              <a:avLst/>
+            </a:prstGeom>
+            <a:ln w="76200">
+              <a:solidFill>
+                <a:schemeClr val="tx1"/>
+              </a:solidFill>
+              <a:tailEnd type="triangle"/>
+            </a:ln>
+          </p:spPr>
+          <p:style>
+            <a:lnRef idx="1">
+              <a:schemeClr val="accent1"/>
+            </a:lnRef>
+            <a:fillRef idx="0">
+              <a:schemeClr val="accent1"/>
+            </a:fillRef>
+            <a:effectRef idx="0">
+              <a:schemeClr val="accent1"/>
+            </a:effectRef>
+            <a:fontRef idx="minor">
+              <a:schemeClr val="tx1"/>
+            </a:fontRef>
+          </p:style>
+        </p:cxnSp>
+        <p:cxnSp>
+          <p:nvCxnSpPr>
+            <p:cNvPr id="83" name="Straight Arrow Connector 82"/>
+            <p:cNvCxnSpPr>
+              <a:stCxn id="69" idx="0"/>
+              <a:endCxn id="71" idx="2"/>
+            </p:cNvCxnSpPr>
+            <p:nvPr/>
+          </p:nvCxnSpPr>
+          <p:spPr>
+            <a:xfrm flipV="1">
+              <a:off x="6783473" y="3869120"/>
+              <a:ext cx="815" cy="895318"/>
+            </a:xfrm>
+            <a:prstGeom prst="straightConnector1">
+              <a:avLst/>
+            </a:prstGeom>
+            <a:ln w="76200">
+              <a:solidFill>
+                <a:schemeClr val="tx1"/>
+              </a:solidFill>
+              <a:tailEnd type="triangle"/>
+            </a:ln>
+          </p:spPr>
+          <p:style>
+            <a:lnRef idx="1">
+              <a:schemeClr val="accent1"/>
+            </a:lnRef>
+            <a:fillRef idx="0">
+              <a:schemeClr val="accent1"/>
+            </a:fillRef>
+            <a:effectRef idx="0">
+              <a:schemeClr val="accent1"/>
+            </a:effectRef>
+            <a:fontRef idx="minor">
+              <a:schemeClr val="tx1"/>
+            </a:fontRef>
+          </p:style>
+        </p:cxnSp>
+        <p:cxnSp>
+          <p:nvCxnSpPr>
+            <p:cNvPr id="85" name="Straight Arrow Connector 84"/>
+            <p:cNvCxnSpPr>
+              <a:stCxn id="71" idx="3"/>
+              <a:endCxn id="33" idx="1"/>
+            </p:cNvCxnSpPr>
+            <p:nvPr/>
+          </p:nvCxnSpPr>
+          <p:spPr>
+            <a:xfrm>
+              <a:off x="7841482" y="3498843"/>
+              <a:ext cx="1273256" cy="12826"/>
+            </a:xfrm>
+            <a:prstGeom prst="straightConnector1">
+              <a:avLst/>
+            </a:prstGeom>
+            <a:ln w="76200">
+              <a:solidFill>
+                <a:schemeClr val="tx1"/>
+              </a:solidFill>
+              <a:tailEnd type="triangle"/>
+            </a:ln>
+          </p:spPr>
+          <p:style>
+            <a:lnRef idx="1">
+              <a:schemeClr val="accent1"/>
+            </a:lnRef>
+            <a:fillRef idx="0">
+              <a:schemeClr val="accent1"/>
+            </a:fillRef>
+            <a:effectRef idx="0">
+              <a:schemeClr val="accent1"/>
+            </a:effectRef>
+            <a:fontRef idx="minor">
+              <a:schemeClr val="tx1"/>
+            </a:fontRef>
+          </p:style>
+        </p:cxnSp>
+        <p:cxnSp>
+          <p:nvCxnSpPr>
+            <p:cNvPr id="87" name="Straight Arrow Connector 86"/>
+            <p:cNvCxnSpPr>
+              <a:stCxn id="21" idx="0"/>
+              <a:endCxn id="28" idx="2"/>
+            </p:cNvCxnSpPr>
+            <p:nvPr/>
+          </p:nvCxnSpPr>
+          <p:spPr>
+            <a:xfrm flipV="1">
+              <a:off x="3706887" y="5501477"/>
+              <a:ext cx="5469" cy="736945"/>
+            </a:xfrm>
+            <a:prstGeom prst="straightConnector1">
+              <a:avLst/>
+            </a:prstGeom>
+            <a:ln w="76200">
+              <a:solidFill>
+                <a:schemeClr val="tx1"/>
+              </a:solidFill>
+              <a:tailEnd type="triangle"/>
+            </a:ln>
+          </p:spPr>
+          <p:style>
+            <a:lnRef idx="1">
+              <a:schemeClr val="accent1"/>
+            </a:lnRef>
+            <a:fillRef idx="0">
+              <a:schemeClr val="accent1"/>
+            </a:fillRef>
+            <a:effectRef idx="0">
+              <a:schemeClr val="accent1"/>
+            </a:effectRef>
+            <a:fontRef idx="minor">
+              <a:schemeClr val="tx1"/>
+            </a:fontRef>
+          </p:style>
+        </p:cxnSp>
+        <p:cxnSp>
+          <p:nvCxnSpPr>
+            <p:cNvPr id="89" name="Straight Arrow Connector 88"/>
+            <p:cNvCxnSpPr>
+              <a:stCxn id="43" idx="1"/>
+              <a:endCxn id="21" idx="3"/>
+            </p:cNvCxnSpPr>
+            <p:nvPr/>
+          </p:nvCxnSpPr>
+          <p:spPr>
+            <a:xfrm flipH="1">
+              <a:off x="4995755" y="6606932"/>
+              <a:ext cx="811664" cy="1767"/>
+            </a:xfrm>
+            <a:prstGeom prst="straightConnector1">
+              <a:avLst/>
+            </a:prstGeom>
+            <a:ln w="76200">
+              <a:solidFill>
+                <a:schemeClr val="tx1"/>
+              </a:solidFill>
+              <a:tailEnd type="triangle"/>
+            </a:ln>
+          </p:spPr>
+          <p:style>
+            <a:lnRef idx="1">
+              <a:schemeClr val="accent1"/>
+            </a:lnRef>
+            <a:fillRef idx="0">
+              <a:schemeClr val="accent1"/>
+            </a:fillRef>
+            <a:effectRef idx="0">
+              <a:schemeClr val="accent1"/>
+            </a:effectRef>
+            <a:fontRef idx="minor">
+              <a:schemeClr val="tx1"/>
+            </a:fontRef>
+          </p:style>
+        </p:cxnSp>
+        <p:cxnSp>
+          <p:nvCxnSpPr>
+            <p:cNvPr id="92" name="Elbow Connector 91"/>
+            <p:cNvCxnSpPr>
+              <a:stCxn id="39" idx="2"/>
+              <a:endCxn id="42" idx="6"/>
+            </p:cNvCxnSpPr>
+            <p:nvPr/>
+          </p:nvCxnSpPr>
+          <p:spPr>
+            <a:xfrm rot="5400000">
+              <a:off x="8350997" y="4882495"/>
+              <a:ext cx="1105455" cy="2343418"/>
+            </a:xfrm>
+            <a:prstGeom prst="bentConnector2">
+              <a:avLst/>
+            </a:prstGeom>
+            <a:ln w="76200">
+              <a:solidFill>
+                <a:schemeClr val="tx1"/>
+              </a:solidFill>
+              <a:tailEnd type="triangle"/>
+            </a:ln>
+          </p:spPr>
+          <p:style>
+            <a:lnRef idx="1">
+              <a:schemeClr val="accent1"/>
+            </a:lnRef>
+            <a:fillRef idx="0">
+              <a:schemeClr val="accent1"/>
+            </a:fillRef>
+            <a:effectRef idx="0">
+              <a:schemeClr val="accent1"/>
+            </a:effectRef>
+            <a:fontRef idx="minor">
+              <a:schemeClr val="tx1"/>
+            </a:fontRef>
+          </p:style>
+        </p:cxnSp>
+      </p:grpSp>
+    </p:spTree>
+    <p:extLst>
+      <p:ext uri="{BB962C8B-B14F-4D97-AF65-F5344CB8AC3E}">
+        <p14:creationId xmlns:p14="http://schemas.microsoft.com/office/powerpoint/2010/main" val="1005105890"/>
+      </p:ext>
+    </p:extLst>
+  </p:cSld>
+  <p:clrMapOvr>
+    <a:masterClrMapping/>
+  </p:clrMapOvr>
+</p:sld>
+</file>
+
 <file path=ppt/theme/theme1.xml><?xml version="1.0" encoding="utf-8"?>
 <a:theme xmlns:a="http://schemas.openxmlformats.org/drawingml/2006/main" name="Office Theme">
   <a:themeElements>
@@ -3707,4 +5683,265 @@
     </a:ext>
   </a:extLst>
 </a:theme>
+</file>
+
+<file path=ppt/theme/theme2.xml><?xml version="1.0" encoding="utf-8"?>
+<a:theme xmlns:a="http://schemas.openxmlformats.org/drawingml/2006/main" name="Office Theme">
+  <a:themeElements>
+    <a:clrScheme name="Office">
+      <a:dk1>
+        <a:sysClr val="windowText" lastClr="000000"/>
+      </a:dk1>
+      <a:lt1>
+        <a:sysClr val="window" lastClr="FFFFFF"/>
+      </a:lt1>
+      <a:dk2>
+        <a:srgbClr val="44546A"/>
+      </a:dk2>
+      <a:lt2>
+        <a:srgbClr val="E7E6E6"/>
+      </a:lt2>
+      <a:accent1>
+        <a:srgbClr val="5B9BD5"/>
+      </a:accent1>
+      <a:accent2>
+        <a:srgbClr val="ED7D31"/>
+      </a:accent2>
+      <a:accent3>
+        <a:srgbClr val="A5A5A5"/>
+      </a:accent3>
+      <a:accent4>
+        <a:srgbClr val="FFC000"/>
+      </a:accent4>
+      <a:accent5>
+        <a:srgbClr val="4472C4"/>
+      </a:accent5>
+      <a:accent6>
+        <a:srgbClr val="70AD47"/>
+      </a:accent6>
+      <a:hlink>
+        <a:srgbClr val="0563C1"/>
+      </a:hlink>
+      <a:folHlink>
+        <a:srgbClr val="954F72"/>
+      </a:folHlink>
+    </a:clrScheme>
+    <a:fontScheme name="Office">
+      <a:majorFont>
+        <a:latin typeface="Calibri Light" panose="020F0302020204030204"/>
+        <a:ea typeface=""/>
+        <a:cs typeface=""/>
+        <a:font script="Jpan" typeface="ＭＳ Ｐゴシック"/>
+        <a:font script="Hang" typeface="맑은 고딕"/>
+        <a:font script="Hans" typeface="宋体"/>
+        <a:font script="Hant" typeface="新細明體"/>
+        <a:font script="Arab" typeface="Times New Roman"/>
+        <a:font script="Hebr" typeface="Times New Roman"/>
+        <a:font script="Thai" typeface="Angsana New"/>
+        <a:font script="Ethi" typeface="Nyala"/>
+        <a:font script="Beng" typeface="Vrinda"/>
+        <a:font script="Gujr" typeface="Shruti"/>
+        <a:font script="Khmr" typeface="MoolBoran"/>
+        <a:font script="Knda" typeface="Tunga"/>
+        <a:font script="Guru" typeface="Raavi"/>
+        <a:font script="Cans" typeface="Euphemia"/>
+        <a:font script="Cher" typeface="Plantagenet Cherokee"/>
+        <a:font script="Yiii" typeface="Microsoft Yi Baiti"/>
+        <a:font script="Tibt" typeface="Microsoft Himalaya"/>
+        <a:font script="Thaa" typeface="MV Boli"/>
+        <a:font script="Deva" typeface="Mangal"/>
+        <a:font script="Telu" typeface="Gautami"/>
+        <a:font script="Taml" typeface="Latha"/>
+        <a:font script="Syrc" typeface="Estrangelo Edessa"/>
+        <a:font script="Orya" typeface="Kalinga"/>
+        <a:font script="Mlym" typeface="Kartika"/>
+        <a:font script="Laoo" typeface="DokChampa"/>
+        <a:font script="Sinh" typeface="Iskoola Pota"/>
+        <a:font script="Mong" typeface="Mongolian Baiti"/>
+        <a:font script="Viet" typeface="Times New Roman"/>
+        <a:font script="Uigh" typeface="Microsoft Uighur"/>
+        <a:font script="Geor" typeface="Sylfaen"/>
+      </a:majorFont>
+      <a:minorFont>
+        <a:latin typeface="Calibri" panose="020F0502020204030204"/>
+        <a:ea typeface=""/>
+        <a:cs typeface=""/>
+        <a:font script="Jpan" typeface="ＭＳ Ｐゴシック"/>
+        <a:font script="Hang" typeface="맑은 고딕"/>
+        <a:font script="Hans" typeface="宋体"/>
+        <a:font script="Hant" typeface="新細明體"/>
+        <a:font script="Arab" typeface="Arial"/>
+        <a:font script="Hebr" typeface="Arial"/>
+        <a:font script="Thai" typeface="Cordia New"/>
+        <a:font script="Ethi" typeface="Nyala"/>
+        <a:font script="Beng" typeface="Vrinda"/>
+        <a:font script="Gujr" typeface="Shruti"/>
+        <a:font script="Khmr" typeface="DaunPenh"/>
+        <a:font script="Knda" typeface="Tunga"/>
+        <a:font script="Guru" typeface="Raavi"/>
+        <a:font script="Cans" typeface="Euphemia"/>
+        <a:font script="Cher" typeface="Plantagenet Cherokee"/>
+        <a:font script="Yiii" typeface="Microsoft Yi Baiti"/>
+        <a:font script="Tibt" typeface="Microsoft Himalaya"/>
+        <a:font script="Thaa" typeface="MV Boli"/>
+        <a:font script="Deva" typeface="Mangal"/>
+        <a:font script="Telu" typeface="Gautami"/>
+        <a:font script="Taml" typeface="Latha"/>
+        <a:font script="Syrc" typeface="Estrangelo Edessa"/>
+        <a:font script="Orya" typeface="Kalinga"/>
+        <a:font script="Mlym" typeface="Kartika"/>
+        <a:font script="Laoo" typeface="DokChampa"/>
+        <a:font script="Sinh" typeface="Iskoola Pota"/>
+        <a:font script="Mong" typeface="Mongolian Baiti"/>
+        <a:font script="Viet" typeface="Arial"/>
+        <a:font script="Uigh" typeface="Microsoft Uighur"/>
+        <a:font script="Geor" typeface="Sylfaen"/>
+      </a:minorFont>
+    </a:fontScheme>
+    <a:fmtScheme name="Office">
+      <a:fillStyleLst>
+        <a:solidFill>
+          <a:schemeClr val="phClr"/>
+        </a:solidFill>
+        <a:gradFill rotWithShape="1">
+          <a:gsLst>
+            <a:gs pos="0">
+              <a:schemeClr val="phClr">
+                <a:lumMod val="110000"/>
+                <a:satMod val="105000"/>
+                <a:tint val="67000"/>
+              </a:schemeClr>
+            </a:gs>
+            <a:gs pos="50000">
+              <a:schemeClr val="phClr">
+                <a:lumMod val="105000"/>
+                <a:satMod val="103000"/>
+                <a:tint val="73000"/>
+              </a:schemeClr>
+            </a:gs>
+            <a:gs pos="100000">
+              <a:schemeClr val="phClr">
+                <a:lumMod val="105000"/>
+                <a:satMod val="109000"/>
+                <a:tint val="81000"/>
+              </a:schemeClr>
+            </a:gs>
+          </a:gsLst>
+          <a:lin ang="5400000" scaled="0"/>
+        </a:gradFill>
+        <a:gradFill rotWithShape="1">
+          <a:gsLst>
+            <a:gs pos="0">
+              <a:schemeClr val="phClr">
+                <a:satMod val="103000"/>
+                <a:lumMod val="102000"/>
+                <a:tint val="94000"/>
+              </a:schemeClr>
+            </a:gs>
+            <a:gs pos="50000">
+              <a:schemeClr val="phClr">
+                <a:satMod val="110000"/>
+                <a:lumMod val="100000"/>
+                <a:shade val="100000"/>
+              </a:schemeClr>
+            </a:gs>
+            <a:gs pos="100000">
+              <a:schemeClr val="phClr">
+                <a:lumMod val="99000"/>
+                <a:satMod val="120000"/>
+                <a:shade val="78000"/>
+              </a:schemeClr>
+            </a:gs>
+          </a:gsLst>
+          <a:lin ang="5400000" scaled="0"/>
+        </a:gradFill>
+      </a:fillStyleLst>
+      <a:lnStyleLst>
+        <a:ln w="6350" cap="flat" cmpd="sng" algn="ctr">
+          <a:solidFill>
+            <a:schemeClr val="phClr"/>
+          </a:solidFill>
+          <a:prstDash val="solid"/>
+          <a:miter lim="800000"/>
+        </a:ln>
+        <a:ln w="12700" cap="flat" cmpd="sng" algn="ctr">
+          <a:solidFill>
+            <a:schemeClr val="phClr"/>
+          </a:solidFill>
+          <a:prstDash val="solid"/>
+          <a:miter lim="800000"/>
+        </a:ln>
+        <a:ln w="19050" cap="flat" cmpd="sng" algn="ctr">
+          <a:solidFill>
+            <a:schemeClr val="phClr"/>
+          </a:solidFill>
+          <a:prstDash val="solid"/>
+          <a:miter lim="800000"/>
+        </a:ln>
+      </a:lnStyleLst>
+      <a:effectStyleLst>
+        <a:effectStyle>
+          <a:effectLst/>
+        </a:effectStyle>
+        <a:effectStyle>
+          <a:effectLst/>
+        </a:effectStyle>
+        <a:effectStyle>
+          <a:effectLst>
+            <a:outerShdw blurRad="57150" dist="19050" dir="5400000" algn="ctr" rotWithShape="0">
+              <a:srgbClr val="000000">
+                <a:alpha val="63000"/>
+              </a:srgbClr>
+            </a:outerShdw>
+          </a:effectLst>
+        </a:effectStyle>
+      </a:effectStyleLst>
+      <a:bgFillStyleLst>
+        <a:solidFill>
+          <a:schemeClr val="phClr"/>
+        </a:solidFill>
+        <a:solidFill>
+          <a:schemeClr val="phClr">
+            <a:tint val="95000"/>
+            <a:satMod val="170000"/>
+          </a:schemeClr>
+        </a:solidFill>
+        <a:gradFill rotWithShape="1">
+          <a:gsLst>
+            <a:gs pos="0">
+              <a:schemeClr val="phClr">
+                <a:tint val="93000"/>
+                <a:satMod val="150000"/>
+                <a:shade val="98000"/>
+                <a:lumMod val="102000"/>
+              </a:schemeClr>
+            </a:gs>
+            <a:gs pos="50000">
+              <a:schemeClr val="phClr">
+                <a:tint val="98000"/>
+                <a:satMod val="130000"/>
+                <a:shade val="90000"/>
+                <a:lumMod val="103000"/>
+              </a:schemeClr>
+            </a:gs>
+            <a:gs pos="100000">
+              <a:schemeClr val="phClr">
+                <a:shade val="63000"/>
+                <a:satMod val="120000"/>
+              </a:schemeClr>
+            </a:gs>
+          </a:gsLst>
+          <a:lin ang="5400000" scaled="0"/>
+        </a:gradFill>
+      </a:bgFillStyleLst>
+    </a:fmtScheme>
+  </a:themeElements>
+  <a:objectDefaults/>
+  <a:extraClrSchemeLst/>
+  <a:extLst>
+    <a:ext uri="{05A4C25C-085E-4340-85A3-A5531E510DB2}">
+      <thm15:themeFamily xmlns:thm15="http://schemas.microsoft.com/office/thememl/2012/main" name="Office Theme" id="{62F939B6-93AF-4DB8-9C6B-D6C7DFDC589F}" vid="{4A3C46E8-61CC-4603-A589-7422A47A8E4A}"/>
+    </a:ext>
+  </a:extLst>
+</a:theme>
 </file>
</xml_diff>